<commit_message>
update logos to be consistency
</commit_message>
<xml_diff>
--- a/img/banner.pptx
+++ b/img/banner.pptx
@@ -3032,7 +3032,7 @@
       </p:pic>
       <p:pic>
         <p:nvPicPr>
-          <p:cNvPr id="7" name="Picture 6"/>
+          <p:cNvPr id="8" name="Picture 7"/>
           <p:cNvPicPr>
             <a:picLocks noChangeAspect="1"/>
           </p:cNvPicPr>
@@ -3052,36 +3052,6 @@
         </p:blipFill>
         <p:spPr>
           <a:xfrm>
-            <a:off x="6104180" y="4774645"/>
-            <a:ext cx="819136" cy="819136"/>
-          </a:xfrm>
-          <a:prstGeom prst="rect">
-            <a:avLst/>
-          </a:prstGeom>
-        </p:spPr>
-      </p:pic>
-      <p:pic>
-        <p:nvPicPr>
-          <p:cNvPr id="8" name="Picture 7"/>
-          <p:cNvPicPr>
-            <a:picLocks noChangeAspect="1"/>
-          </p:cNvPicPr>
-          <p:nvPr/>
-        </p:nvPicPr>
-        <p:blipFill>
-          <a:blip r:embed="rId5">
-            <a:extLst>
-              <a:ext uri="{28A0092B-C50C-407E-A947-70E740481C1C}">
-                <a14:useLocalDpi xmlns:a14="http://schemas.microsoft.com/office/drawing/2010/main" val="0"/>
-              </a:ext>
-            </a:extLst>
-          </a:blip>
-          <a:stretch>
-            <a:fillRect/>
-          </a:stretch>
-        </p:blipFill>
-        <p:spPr>
-          <a:xfrm>
             <a:off x="5458267" y="373899"/>
             <a:ext cx="1227579" cy="1227579"/>
           </a:xfrm>
@@ -3099,7 +3069,7 @@
           <p:nvPr/>
         </p:nvPicPr>
         <p:blipFill>
-          <a:blip r:embed="rId6">
+          <a:blip r:embed="rId5">
             <a:extLst>
               <a:ext uri="{28A0092B-C50C-407E-A947-70E740481C1C}">
                 <a14:useLocalDpi xmlns:a14="http://schemas.microsoft.com/office/drawing/2010/main" val="0"/>
@@ -3199,7 +3169,7 @@
             <p:nvPr/>
           </p:nvPicPr>
           <p:blipFill>
-            <a:blip r:embed="rId7">
+            <a:blip r:embed="rId6">
               <a:extLst>
                 <a:ext uri="{28A0092B-C50C-407E-A947-70E740481C1C}">
                   <a14:useLocalDpi xmlns:a14="http://schemas.microsoft.com/office/drawing/2010/main" val="0"/>
@@ -3264,44 +3234,103 @@
       </p:grpSp>
       <p:grpSp>
         <p:nvGrpSpPr>
-          <p:cNvPr id="13" name="Group 12"/>
+          <p:cNvPr id="2" name="Group 1"/>
           <p:cNvGrpSpPr/>
           <p:nvPr/>
         </p:nvGrpSpPr>
         <p:grpSpPr>
           <a:xfrm>
-            <a:off x="4610438" y="4096852"/>
+            <a:off x="6131229" y="1382528"/>
             <a:ext cx="5545399" cy="1938992"/>
-            <a:chOff x="2910423" y="3499214"/>
+            <a:chOff x="6131229" y="1382528"/>
             <a:chExt cx="5545399" cy="1938992"/>
           </a:xfrm>
         </p:grpSpPr>
-        <p:sp>
-          <p:nvSpPr>
-            <p:cNvPr id="14" name="Rectangle 13"/>
-            <p:cNvSpPr/>
+        <p:pic>
+          <p:nvPicPr>
+            <p:cNvPr id="7" name="Picture 6"/>
+            <p:cNvPicPr>
+              <a:picLocks noChangeAspect="1"/>
+            </p:cNvPicPr>
             <p:nvPr/>
-          </p:nvSpPr>
+          </p:nvPicPr>
+          <p:blipFill>
+            <a:blip r:embed="rId7">
+              <a:extLst>
+                <a:ext uri="{28A0092B-C50C-407E-A947-70E740481C1C}">
+                  <a14:useLocalDpi xmlns:a14="http://schemas.microsoft.com/office/drawing/2010/main" val="0"/>
+                </a:ext>
+              </a:extLst>
+            </a:blip>
+            <a:stretch>
+              <a:fillRect/>
+            </a:stretch>
+          </p:blipFill>
           <p:spPr>
             <a:xfrm>
-              <a:off x="2910423" y="3499214"/>
-              <a:ext cx="1516761" cy="1938992"/>
+              <a:off x="7624971" y="2060321"/>
+              <a:ext cx="819136" cy="819136"/>
             </a:xfrm>
             <a:prstGeom prst="rect">
               <a:avLst/>
             </a:prstGeom>
-            <a:noFill/>
-            <a:effectLst/>
           </p:spPr>
-          <p:txBody>
-            <a:bodyPr wrap="none" lIns="91440" tIns="45720" rIns="91440" bIns="45720">
-              <a:spAutoFit/>
-            </a:bodyPr>
-            <a:lstStyle/>
-            <a:p>
-              <a:pPr algn="ctr"/>
-              <a:r>
-                <a:rPr lang="en-US" sz="12000" dirty="0" smtClean="0">
+        </p:pic>
+        <p:grpSp>
+          <p:nvGrpSpPr>
+            <p:cNvPr id="13" name="Group 12"/>
+            <p:cNvGrpSpPr/>
+            <p:nvPr/>
+          </p:nvGrpSpPr>
+          <p:grpSpPr>
+            <a:xfrm>
+              <a:off x="6131229" y="1382528"/>
+              <a:ext cx="5545399" cy="1938992"/>
+              <a:chOff x="2910423" y="3499214"/>
+              <a:chExt cx="5545399" cy="1938992"/>
+            </a:xfrm>
+          </p:grpSpPr>
+          <p:sp>
+            <p:nvSpPr>
+              <p:cNvPr id="14" name="Rectangle 13"/>
+              <p:cNvSpPr/>
+              <p:nvPr/>
+            </p:nvSpPr>
+            <p:spPr>
+              <a:xfrm>
+                <a:off x="2910423" y="3499214"/>
+                <a:ext cx="1516761" cy="1938992"/>
+              </a:xfrm>
+              <a:prstGeom prst="rect">
+                <a:avLst/>
+              </a:prstGeom>
+              <a:noFill/>
+              <a:effectLst/>
+            </p:spPr>
+            <p:txBody>
+              <a:bodyPr wrap="none" lIns="91440" tIns="45720" rIns="91440" bIns="45720">
+                <a:spAutoFit/>
+              </a:bodyPr>
+              <a:lstStyle/>
+              <a:p>
+                <a:pPr algn="ctr"/>
+                <a:r>
+                  <a:rPr lang="en-US" sz="12000" dirty="0" smtClean="0">
+                    <a:ln w="0"/>
+                    <a:solidFill>
+                      <a:srgbClr val="ED282D"/>
+                    </a:solidFill>
+                    <a:effectLst>
+                      <a:outerShdw blurRad="38100" dist="19050" dir="2700000" algn="tl" rotWithShape="0">
+                        <a:schemeClr val="dk1">
+                          <a:alpha val="40000"/>
+                        </a:schemeClr>
+                      </a:outerShdw>
+                    </a:effectLst>
+                  </a:rPr>
+                  <a:t>Pr</a:t>
+                </a:r>
+                <a:endParaRPr lang="en-US" sz="12000" dirty="0">
                   <a:ln w="0"/>
                   <a:solidFill>
                     <a:srgbClr val="ED282D"/>
@@ -3313,48 +3342,122 @@
                       </a:schemeClr>
                     </a:outerShdw>
                   </a:effectLst>
-                </a:rPr>
-                <a:t>Pr</a:t>
-              </a:r>
-              <a:endParaRPr lang="en-US" sz="12000" dirty="0">
-                <a:ln w="0"/>
-                <a:solidFill>
-                  <a:srgbClr val="ED282D"/>
-                </a:solidFill>
-                <a:effectLst>
-                  <a:outerShdw blurRad="38100" dist="19050" dir="2700000" algn="tl" rotWithShape="0">
-                    <a:schemeClr val="dk1">
-                      <a:alpha val="40000"/>
-                    </a:schemeClr>
-                  </a:outerShdw>
-                </a:effectLst>
-              </a:endParaRPr>
-            </a:p>
-          </p:txBody>
-        </p:sp>
-        <p:sp>
-          <p:nvSpPr>
-            <p:cNvPr id="16" name="Rectangle 15"/>
-            <p:cNvSpPr/>
+                </a:endParaRPr>
+              </a:p>
+            </p:txBody>
+          </p:sp>
+          <p:sp>
+            <p:nvSpPr>
+              <p:cNvPr id="16" name="Rectangle 15"/>
+              <p:cNvSpPr/>
+              <p:nvPr/>
+            </p:nvSpPr>
+            <p:spPr>
+              <a:xfrm>
+                <a:off x="5151712" y="3499214"/>
+                <a:ext cx="3304110" cy="1938992"/>
+              </a:xfrm>
+              <a:prstGeom prst="rect">
+                <a:avLst/>
+              </a:prstGeom>
+            </p:spPr>
+            <p:txBody>
+              <a:bodyPr wrap="none">
+                <a:spAutoFit/>
+              </a:bodyPr>
+              <a:lstStyle/>
+              <a:p>
+                <a:r>
+                  <a:rPr lang="en-US" sz="12000" dirty="0" smtClean="0">
+                    <a:ln w="0"/>
+                    <a:solidFill>
+                      <a:srgbClr val="415968"/>
+                    </a:solidFill>
+                    <a:effectLst>
+                      <a:outerShdw blurRad="38100" dist="19050" dir="2700000" algn="tl" rotWithShape="0">
+                        <a:schemeClr val="dk1">
+                          <a:alpha val="40000"/>
+                        </a:schemeClr>
+                      </a:outerShdw>
+                    </a:effectLst>
+                  </a:rPr>
+                  <a:t>pane</a:t>
+                </a:r>
+                <a:endParaRPr lang="en-US" sz="12000" dirty="0"/>
+              </a:p>
+            </p:txBody>
+          </p:sp>
+        </p:grpSp>
+      </p:grpSp>
+      <p:grpSp>
+        <p:nvGrpSpPr>
+          <p:cNvPr id="20" name="Group 19"/>
+          <p:cNvGrpSpPr/>
+          <p:nvPr/>
+        </p:nvGrpSpPr>
+        <p:grpSpPr>
+          <a:xfrm>
+            <a:off x="2217347" y="4168778"/>
+            <a:ext cx="5545399" cy="1938992"/>
+            <a:chOff x="2217347" y="4168778"/>
+            <a:chExt cx="5545399" cy="1938992"/>
+          </a:xfrm>
+        </p:grpSpPr>
+        <p:grpSp>
+          <p:nvGrpSpPr>
+            <p:cNvPr id="15" name="Group 14"/>
+            <p:cNvGrpSpPr/>
             <p:nvPr/>
-          </p:nvSpPr>
-          <p:spPr>
+          </p:nvGrpSpPr>
+          <p:grpSpPr>
             <a:xfrm>
-              <a:off x="5151712" y="3499214"/>
-              <a:ext cx="3304110" cy="1938992"/>
+              <a:off x="2217347" y="4168778"/>
+              <a:ext cx="5545399" cy="1938992"/>
+              <a:chOff x="2910423" y="3499214"/>
+              <a:chExt cx="5545399" cy="1938992"/>
             </a:xfrm>
-            <a:prstGeom prst="rect">
-              <a:avLst/>
-            </a:prstGeom>
-          </p:spPr>
-          <p:txBody>
-            <a:bodyPr wrap="none">
-              <a:spAutoFit/>
-            </a:bodyPr>
-            <a:lstStyle/>
-            <a:p>
-              <a:r>
-                <a:rPr lang="en-US" sz="12000" dirty="0" smtClean="0">
+          </p:grpSpPr>
+          <p:sp>
+            <p:nvSpPr>
+              <p:cNvPr id="17" name="Rectangle 16"/>
+              <p:cNvSpPr/>
+              <p:nvPr/>
+            </p:nvSpPr>
+            <p:spPr>
+              <a:xfrm>
+                <a:off x="2910423" y="3499214"/>
+                <a:ext cx="1516761" cy="1938992"/>
+              </a:xfrm>
+              <a:prstGeom prst="rect">
+                <a:avLst/>
+              </a:prstGeom>
+              <a:noFill/>
+              <a:effectLst/>
+            </p:spPr>
+            <p:txBody>
+              <a:bodyPr wrap="none" lIns="91440" tIns="45720" rIns="91440" bIns="45720">
+                <a:spAutoFit/>
+              </a:bodyPr>
+              <a:lstStyle/>
+              <a:p>
+                <a:pPr algn="ctr"/>
+                <a:r>
+                  <a:rPr lang="en-US" sz="12000" dirty="0" smtClean="0">
+                    <a:ln w="0"/>
+                    <a:solidFill>
+                      <a:srgbClr val="415968"/>
+                    </a:solidFill>
+                    <a:effectLst>
+                      <a:outerShdw blurRad="38100" dist="19050" dir="2700000" algn="tl" rotWithShape="0">
+                        <a:schemeClr val="dk1">
+                          <a:alpha val="40000"/>
+                        </a:schemeClr>
+                      </a:outerShdw>
+                    </a:effectLst>
+                  </a:rPr>
+                  <a:t>Pr</a:t>
+                </a:r>
+                <a:endParaRPr lang="en-US" sz="12000" dirty="0">
                   <a:ln w="0"/>
                   <a:solidFill>
                     <a:srgbClr val="415968"/>
@@ -3366,13 +3469,82 @@
                       </a:schemeClr>
                     </a:outerShdw>
                   </a:effectLst>
-                </a:rPr>
-                <a:t>pane</a:t>
-              </a:r>
-              <a:endParaRPr lang="en-US" sz="12000" dirty="0"/>
-            </a:p>
-          </p:txBody>
-        </p:sp>
+                </a:endParaRPr>
+              </a:p>
+            </p:txBody>
+          </p:sp>
+          <p:sp>
+            <p:nvSpPr>
+              <p:cNvPr id="19" name="Rectangle 18"/>
+              <p:cNvSpPr/>
+              <p:nvPr/>
+            </p:nvSpPr>
+            <p:spPr>
+              <a:xfrm>
+                <a:off x="5151712" y="3499214"/>
+                <a:ext cx="3304110" cy="1938992"/>
+              </a:xfrm>
+              <a:prstGeom prst="rect">
+                <a:avLst/>
+              </a:prstGeom>
+            </p:spPr>
+            <p:txBody>
+              <a:bodyPr wrap="none">
+                <a:spAutoFit/>
+              </a:bodyPr>
+              <a:lstStyle/>
+              <a:p>
+                <a:r>
+                  <a:rPr lang="en-US" sz="12000" dirty="0" smtClean="0">
+                    <a:ln w="0"/>
+                    <a:solidFill>
+                      <a:srgbClr val="415968"/>
+                    </a:solidFill>
+                    <a:effectLst>
+                      <a:outerShdw blurRad="38100" dist="19050" dir="2700000" algn="tl" rotWithShape="0">
+                        <a:schemeClr val="dk1">
+                          <a:alpha val="40000"/>
+                        </a:schemeClr>
+                      </a:outerShdw>
+                    </a:effectLst>
+                  </a:rPr>
+                  <a:t>pane</a:t>
+                </a:r>
+                <a:endParaRPr lang="en-US" sz="12000" dirty="0"/>
+              </a:p>
+            </p:txBody>
+          </p:sp>
+        </p:grpSp>
+        <p:pic>
+          <p:nvPicPr>
+            <p:cNvPr id="3" name="Picture 2"/>
+            <p:cNvPicPr>
+              <a:picLocks noChangeAspect="1"/>
+            </p:cNvPicPr>
+            <p:nvPr/>
+          </p:nvPicPr>
+          <p:blipFill>
+            <a:blip r:embed="rId8">
+              <a:extLst>
+                <a:ext uri="{28A0092B-C50C-407E-A947-70E740481C1C}">
+                  <a14:useLocalDpi xmlns:a14="http://schemas.microsoft.com/office/drawing/2010/main" val="0"/>
+                </a:ext>
+              </a:extLst>
+            </a:blip>
+            <a:stretch>
+              <a:fillRect/>
+            </a:stretch>
+          </p:blipFill>
+          <p:spPr>
+            <a:xfrm>
+              <a:off x="3695247" y="4869503"/>
+              <a:ext cx="822648" cy="822648"/>
+            </a:xfrm>
+            <a:prstGeom prst="rect">
+              <a:avLst/>
+            </a:prstGeom>
+          </p:spPr>
+        </p:pic>
       </p:grpSp>
     </p:spTree>
     <p:extLst>

</xml_diff>